<commit_message>
added solution for Week 5 homework
</commit_message>
<xml_diff>
--- a/Week 7 -- spatiotemporal models/Lab/Lab 7 -- spatial-Gompertz model.pptx
+++ b/Week 7 -- spatiotemporal models/Lab/Lab 7 -- spatial-Gompertz model.pptx
@@ -3592,11 +3592,7 @@
                 </a:pPr>
                 <a:r>
                   <a:rPr lang="en-US" dirty="0" smtClean="0"/>
-                  <a:t>REVIEW: Four </a:t>
-                </a:r>
-                <a:r>
-                  <a:rPr lang="en-US" dirty="0" smtClean="0"/>
-                  <a:t>ways to code </a:t>
+                  <a:t>REVIEW: Four ways to code </a:t>
                 </a:r>
               </a:p>
               <a:p>
@@ -4109,7 +4105,17 @@
                       </a:schemeClr>
                     </a:solidFill>
                   </a:rPr>
-                  <a:t>3.  	Via multivariate normal density function in TMB</a:t>
+                  <a:t>3.  </a:t>
+                </a:r>
+                <a:r>
+                  <a:rPr lang="en-US" dirty="0" smtClean="0">
+                    <a:solidFill>
+                      <a:schemeClr val="bg1">
+                        <a:lumMod val="85000"/>
+                      </a:schemeClr>
+                    </a:solidFill>
+                  </a:rPr>
+                  <a:t>	Via multivariate normal density function in TMB</a:t>
                 </a:r>
               </a:p>
               <a:p>
@@ -4124,6 +4130,11 @@
                     <m:oMath xmlns:m="http://schemas.openxmlformats.org/officeDocument/2006/math">
                       <m:r>
                         <a:rPr lang="en-US" b="1">
+                          <a:solidFill>
+                            <a:schemeClr val="bg1">
+                              <a:lumMod val="85000"/>
+                            </a:schemeClr>
+                          </a:solidFill>
                           <a:latin typeface="Cambria Math" panose="02040503050406030204" pitchFamily="18" charset="0"/>
                           <a:ea typeface="Cambria Math" panose="02040503050406030204" pitchFamily="18" charset="0"/>
                         </a:rPr>
@@ -4131,6 +4142,11 @@
                       </m:r>
                       <m:r>
                         <a:rPr lang="en-US" i="1">
+                          <a:solidFill>
+                            <a:schemeClr val="bg1">
+                              <a:lumMod val="85000"/>
+                            </a:schemeClr>
+                          </a:solidFill>
                           <a:latin typeface="Cambria Math" panose="02040503050406030204" pitchFamily="18" charset="0"/>
                           <a:ea typeface="Cambria Math" panose="02040503050406030204" pitchFamily="18" charset="0"/>
                         </a:rPr>
@@ -4138,6 +4154,11 @@
                       </m:r>
                       <m:r>
                         <a:rPr lang="en-US" i="1">
+                          <a:solidFill>
+                            <a:schemeClr val="bg1">
+                              <a:lumMod val="85000"/>
+                            </a:schemeClr>
+                          </a:solidFill>
                           <a:latin typeface="Cambria Math" panose="02040503050406030204" pitchFamily="18" charset="0"/>
                           <a:ea typeface="Cambria Math" panose="02040503050406030204" pitchFamily="18" charset="0"/>
                         </a:rPr>
@@ -4145,6 +4166,11 @@
                       </m:r>
                       <m:r>
                         <a:rPr lang="en-US" i="1">
+                          <a:solidFill>
+                            <a:schemeClr val="bg1">
+                              <a:lumMod val="85000"/>
+                            </a:schemeClr>
+                          </a:solidFill>
                           <a:latin typeface="Cambria Math" panose="02040503050406030204" pitchFamily="18" charset="0"/>
                           <a:ea typeface="Cambria Math" panose="02040503050406030204" pitchFamily="18" charset="0"/>
                         </a:rPr>
@@ -4152,6 +4178,11 @@
                       </m:r>
                       <m:r>
                         <a:rPr lang="el-GR" b="1">
+                          <a:solidFill>
+                            <a:schemeClr val="bg1">
+                              <a:lumMod val="85000"/>
+                            </a:schemeClr>
+                          </a:solidFill>
                           <a:latin typeface="Cambria Math" panose="02040503050406030204" pitchFamily="18" charset="0"/>
                           <a:ea typeface="Cambria Math" panose="02040503050406030204" pitchFamily="18" charset="0"/>
                         </a:rPr>
@@ -4159,6 +4190,11 @@
                       </m:r>
                       <m:r>
                         <a:rPr lang="en-US" i="1">
+                          <a:solidFill>
+                            <a:schemeClr val="bg1">
+                              <a:lumMod val="85000"/>
+                            </a:schemeClr>
+                          </a:solidFill>
                           <a:latin typeface="Cambria Math" panose="02040503050406030204" pitchFamily="18" charset="0"/>
                           <a:ea typeface="Cambria Math" panose="02040503050406030204" pitchFamily="18" charset="0"/>
                         </a:rPr>
@@ -4167,7 +4203,13 @@
                     </m:oMath>
                   </m:oMathPara>
                 </a14:m>
-                <a:endParaRPr lang="en-US" dirty="0"/>
+                <a:endParaRPr lang="en-US" dirty="0">
+                  <a:solidFill>
+                    <a:schemeClr val="bg1">
+                      <a:lumMod val="85000"/>
+                    </a:schemeClr>
+                  </a:solidFill>
+                </a:endParaRPr>
               </a:p>
               <a:p>
                 <a:pPr marL="400050" lvl="1" indent="0">
@@ -12850,8 +12892,8 @@
           </a:p>
         </p:txBody>
       </p:sp>
-      <mc:AlternateContent xmlns:mc="http://schemas.openxmlformats.org/markup-compatibility/2006" xmlns:a14="http://schemas.microsoft.com/office/drawing/2010/main">
-        <mc:Choice Requires="a14">
+      <mc:AlternateContent xmlns:mc="http://schemas.openxmlformats.org/markup-compatibility/2006">
+        <mc:Choice xmlns:a14="http://schemas.microsoft.com/office/drawing/2010/main" Requires="a14">
           <p:sp>
             <p:nvSpPr>
               <p:cNvPr id="3" name="Content Placeholder 2"/>
@@ -13162,17 +13204,20 @@
                 <a14:m>
                   <m:oMath xmlns:m="http://schemas.openxmlformats.org/officeDocument/2006/math">
                     <m:r>
-                      <a:rPr lang="en-US" b="1">
+                      <a:rPr lang="en-US" b="1" i="0" smtClean="0">
                         <a:latin typeface="Cambria Math" panose="02040503050406030204" pitchFamily="18" charset="0"/>
-                        <a:ea typeface="Cambria Math" panose="02040503050406030204" pitchFamily="18" charset="0"/>
                       </a:rPr>
-                      <m:t>𝐂</m:t>
+                      <m:t>𝐑</m:t>
                     </m:r>
                   </m:oMath>
                 </a14:m>
                 <a:r>
                   <a:rPr lang="en-GB" dirty="0" smtClean="0"/>
-                  <a:t> is the correlation matrix for an AR1 process</a:t>
+                  <a:t> </a:t>
+                </a:r>
+                <a:r>
+                  <a:rPr lang="en-GB" dirty="0" smtClean="0"/>
+                  <a:t>is the correlation matrix for an AR1 process</a:t>
                 </a:r>
               </a:p>
               <a:p>
@@ -13181,7 +13226,7 @@
             </p:txBody>
           </p:sp>
         </mc:Choice>
-        <mc:Fallback xmlns="">
+        <mc:Fallback>
           <p:sp>
             <p:nvSpPr>
               <p:cNvPr id="3" name="Content Placeholder 2"/>
@@ -13237,7 +13282,7 @@
           <a:graphicData uri="http://schemas.openxmlformats.org/presentationml/2006/ole">
             <mc:AlternateContent xmlns:mc="http://schemas.openxmlformats.org/markup-compatibility/2006">
               <mc:Choice xmlns:v="urn:schemas-microsoft-com:vml" Requires="v">
-                <p:oleObj spid="_x0000_s1036" name="Equation" r:id="rId4" imgW="2616120" imgH="1168200" progId="Equation.DSMT4">
+                <p:oleObj spid="_x0000_s1038" name="Equation" r:id="rId4" imgW="2616120" imgH="1168200" progId="Equation.DSMT4">
                   <p:embed/>
                 </p:oleObj>
               </mc:Choice>
@@ -13328,8 +13373,8 @@
           </a:p>
         </p:txBody>
       </p:sp>
-      <mc:AlternateContent xmlns:mc="http://schemas.openxmlformats.org/markup-compatibility/2006">
-        <mc:Choice xmlns:a14="http://schemas.microsoft.com/office/drawing/2010/main" Requires="a14">
+      <mc:AlternateContent xmlns:mc="http://schemas.openxmlformats.org/markup-compatibility/2006" xmlns:a14="http://schemas.microsoft.com/office/drawing/2010/main">
+        <mc:Choice Requires="a14">
           <p:sp>
             <p:nvSpPr>
               <p:cNvPr id="3" name="Content Placeholder 2"/>
@@ -13350,11 +13395,7 @@
                 </a:pPr>
                 <a:r>
                   <a:rPr lang="en-US" dirty="0" smtClean="0"/>
-                  <a:t>REVIEW: Four </a:t>
-                </a:r>
-                <a:r>
-                  <a:rPr lang="en-US" dirty="0" smtClean="0"/>
-                  <a:t>ways to code </a:t>
+                  <a:t>REVIEW: Four ways to code </a:t>
                 </a:r>
               </a:p>
               <a:p>
@@ -13914,7 +13955,7 @@
             </p:txBody>
           </p:sp>
         </mc:Choice>
-        <mc:Fallback>
+        <mc:Fallback xmlns="">
           <p:sp>
             <p:nvSpPr>
               <p:cNvPr id="3" name="Content Placeholder 2"/>
@@ -14004,8 +14045,8 @@
           </a:p>
         </p:txBody>
       </p:sp>
-      <mc:AlternateContent xmlns:mc="http://schemas.openxmlformats.org/markup-compatibility/2006" xmlns:a14="http://schemas.microsoft.com/office/drawing/2010/main">
-        <mc:Choice Requires="a14">
+      <mc:AlternateContent xmlns:mc="http://schemas.openxmlformats.org/markup-compatibility/2006">
+        <mc:Choice xmlns:a14="http://schemas.microsoft.com/office/drawing/2010/main" Requires="a14">
           <p:sp>
             <p:nvSpPr>
               <p:cNvPr id="3" name="Content Placeholder 2"/>
@@ -14481,6 +14522,13 @@
                             </a:rPr>
                             <m:t>𝑡</m:t>
                           </m:r>
+                          <m:r>
+                            <a:rPr lang="en-US" b="0" i="1" smtClean="0">
+                              <a:latin typeface="Cambria Math" panose="02040503050406030204" pitchFamily="18" charset="0"/>
+                              <a:ea typeface="Cambria Math" panose="02040503050406030204" pitchFamily="18" charset="0"/>
+                            </a:rPr>
+                            <m:t>+1</m:t>
+                          </m:r>
                         </m:sub>
                       </m:sSub>
                       <m:r>
@@ -14505,12 +14553,40 @@
                         <m:t>(</m:t>
                       </m:r>
                       <m:r>
-                        <a:rPr lang="en-US" b="1" i="1">
+                        <a:rPr lang="en-US" i="1" smtClean="0">
                           <a:latin typeface="Cambria Math" panose="02040503050406030204" pitchFamily="18" charset="0"/>
                           <a:ea typeface="Cambria Math" panose="02040503050406030204" pitchFamily="18" charset="0"/>
                         </a:rPr>
-                        <m:t>𝟎</m:t>
-                      </m:r>
+                        <m:t>𝜌</m:t>
+                      </m:r>
+                      <m:sSub>
+                        <m:sSubPr>
+                          <m:ctrlPr>
+                            <a:rPr lang="en-US" i="1">
+                              <a:latin typeface="Cambria Math" panose="02040503050406030204" pitchFamily="18" charset="0"/>
+                              <a:ea typeface="Cambria Math" panose="02040503050406030204" pitchFamily="18" charset="0"/>
+                            </a:rPr>
+                          </m:ctrlPr>
+                        </m:sSubPr>
+                        <m:e>
+                          <m:r>
+                            <a:rPr lang="en-US" b="1">
+                              <a:latin typeface="Cambria Math" panose="02040503050406030204" pitchFamily="18" charset="0"/>
+                              <a:ea typeface="Cambria Math" panose="02040503050406030204" pitchFamily="18" charset="0"/>
+                            </a:rPr>
+                            <m:t>𝛆</m:t>
+                          </m:r>
+                        </m:e>
+                        <m:sub>
+                          <m:r>
+                            <a:rPr lang="en-US" i="1">
+                              <a:latin typeface="Cambria Math" panose="02040503050406030204" pitchFamily="18" charset="0"/>
+                              <a:ea typeface="Cambria Math" panose="02040503050406030204" pitchFamily="18" charset="0"/>
+                            </a:rPr>
+                            <m:t>𝑡</m:t>
+                          </m:r>
+                        </m:sub>
+                      </m:sSub>
                       <m:r>
                         <a:rPr lang="en-US" i="1">
                           <a:latin typeface="Cambria Math" panose="02040503050406030204" pitchFamily="18" charset="0"/>
@@ -15287,7 +15363,7 @@
             </p:txBody>
           </p:sp>
         </mc:Choice>
-        <mc:Fallback xmlns="">
+        <mc:Fallback>
           <p:sp>
             <p:nvSpPr>
               <p:cNvPr id="3" name="Content Placeholder 2"/>

</xml_diff>